<commit_message>
Deployed ea47b85 with MkDocs version: 1.6.0
</commit_message>
<xml_diff>
--- a/assets/images/Rstudio.pptx
+++ b/assets/images/Rstudio.pptx
@@ -7,6 +7,7 @@
   <p:sldIdLst>
     <p:sldId id="256" r:id="rId2"/>
     <p:sldId id="257" r:id="rId3"/>
+    <p:sldId id="258" r:id="rId4"/>
   </p:sldIdLst>
   <p:sldSz cx="12192000" cy="6858000"/>
   <p:notesSz cx="6858000" cy="9144000"/>
@@ -260,7 +261,7 @@
           <a:p>
             <a:fld id="{FC24AE3C-D34D-1D48-8A2C-7846DF19EDD7}" type="datetimeFigureOut">
               <a:rPr lang="en-US" smtClean="0"/>
-              <a:t>10/18/24</a:t>
+              <a:t>10/24/24</a:t>
             </a:fld>
             <a:endParaRPr lang="en-US"/>
           </a:p>
@@ -458,7 +459,7 @@
           <a:p>
             <a:fld id="{FC24AE3C-D34D-1D48-8A2C-7846DF19EDD7}" type="datetimeFigureOut">
               <a:rPr lang="en-US" smtClean="0"/>
-              <a:t>10/18/24</a:t>
+              <a:t>10/24/24</a:t>
             </a:fld>
             <a:endParaRPr lang="en-US"/>
           </a:p>
@@ -666,7 +667,7 @@
           <a:p>
             <a:fld id="{FC24AE3C-D34D-1D48-8A2C-7846DF19EDD7}" type="datetimeFigureOut">
               <a:rPr lang="en-US" smtClean="0"/>
-              <a:t>10/18/24</a:t>
+              <a:t>10/24/24</a:t>
             </a:fld>
             <a:endParaRPr lang="en-US"/>
           </a:p>
@@ -864,7 +865,7 @@
           <a:p>
             <a:fld id="{FC24AE3C-D34D-1D48-8A2C-7846DF19EDD7}" type="datetimeFigureOut">
               <a:rPr lang="en-US" smtClean="0"/>
-              <a:t>10/18/24</a:t>
+              <a:t>10/24/24</a:t>
             </a:fld>
             <a:endParaRPr lang="en-US"/>
           </a:p>
@@ -1139,7 +1140,7 @@
           <a:p>
             <a:fld id="{FC24AE3C-D34D-1D48-8A2C-7846DF19EDD7}" type="datetimeFigureOut">
               <a:rPr lang="en-US" smtClean="0"/>
-              <a:t>10/18/24</a:t>
+              <a:t>10/24/24</a:t>
             </a:fld>
             <a:endParaRPr lang="en-US"/>
           </a:p>
@@ -1404,7 +1405,7 @@
           <a:p>
             <a:fld id="{FC24AE3C-D34D-1D48-8A2C-7846DF19EDD7}" type="datetimeFigureOut">
               <a:rPr lang="en-US" smtClean="0"/>
-              <a:t>10/18/24</a:t>
+              <a:t>10/24/24</a:t>
             </a:fld>
             <a:endParaRPr lang="en-US"/>
           </a:p>
@@ -1816,7 +1817,7 @@
           <a:p>
             <a:fld id="{FC24AE3C-D34D-1D48-8A2C-7846DF19EDD7}" type="datetimeFigureOut">
               <a:rPr lang="en-US" smtClean="0"/>
-              <a:t>10/18/24</a:t>
+              <a:t>10/24/24</a:t>
             </a:fld>
             <a:endParaRPr lang="en-US"/>
           </a:p>
@@ -1957,7 +1958,7 @@
           <a:p>
             <a:fld id="{FC24AE3C-D34D-1D48-8A2C-7846DF19EDD7}" type="datetimeFigureOut">
               <a:rPr lang="en-US" smtClean="0"/>
-              <a:t>10/18/24</a:t>
+              <a:t>10/24/24</a:t>
             </a:fld>
             <a:endParaRPr lang="en-US"/>
           </a:p>
@@ -2070,7 +2071,7 @@
           <a:p>
             <a:fld id="{FC24AE3C-D34D-1D48-8A2C-7846DF19EDD7}" type="datetimeFigureOut">
               <a:rPr lang="en-US" smtClean="0"/>
-              <a:t>10/18/24</a:t>
+              <a:t>10/24/24</a:t>
             </a:fld>
             <a:endParaRPr lang="en-US"/>
           </a:p>
@@ -2381,7 +2382,7 @@
           <a:p>
             <a:fld id="{FC24AE3C-D34D-1D48-8A2C-7846DF19EDD7}" type="datetimeFigureOut">
               <a:rPr lang="en-US" smtClean="0"/>
-              <a:t>10/18/24</a:t>
+              <a:t>10/24/24</a:t>
             </a:fld>
             <a:endParaRPr lang="en-US"/>
           </a:p>
@@ -2669,7 +2670,7 @@
           <a:p>
             <a:fld id="{FC24AE3C-D34D-1D48-8A2C-7846DF19EDD7}" type="datetimeFigureOut">
               <a:rPr lang="en-US" smtClean="0"/>
-              <a:t>10/18/24</a:t>
+              <a:t>10/24/24</a:t>
             </a:fld>
             <a:endParaRPr lang="en-US"/>
           </a:p>
@@ -2910,7 +2911,7 @@
           <a:p>
             <a:fld id="{FC24AE3C-D34D-1D48-8A2C-7846DF19EDD7}" type="datetimeFigureOut">
               <a:rPr lang="en-US" smtClean="0"/>
-              <a:t>10/18/24</a:t>
+              <a:t>10/24/24</a:t>
             </a:fld>
             <a:endParaRPr lang="en-US"/>
           </a:p>
@@ -3742,6 +3743,105 @@
 </p:sld>
 </file>
 
+<file path=ppt/slides/slide3.xml><?xml version="1.0" encoding="utf-8"?>
+<p:sld xmlns:a="http://schemas.openxmlformats.org/drawingml/2006/main" xmlns:r="http://schemas.openxmlformats.org/officeDocument/2006/relationships" xmlns:p="http://schemas.openxmlformats.org/presentationml/2006/main">
+  <p:cSld>
+    <p:spTree>
+      <p:nvGrpSpPr>
+        <p:cNvPr id="1" name=""/>
+        <p:cNvGrpSpPr/>
+        <p:nvPr/>
+      </p:nvGrpSpPr>
+      <p:grpSpPr>
+        <a:xfrm>
+          <a:off x="0" y="0"/>
+          <a:ext cx="0" cy="0"/>
+          <a:chOff x="0" y="0"/>
+          <a:chExt cx="0" cy="0"/>
+        </a:xfrm>
+      </p:grpSpPr>
+      <p:pic>
+        <p:nvPicPr>
+          <p:cNvPr id="4" name="Picture 3">
+            <a:extLst>
+              <a:ext uri="{FF2B5EF4-FFF2-40B4-BE49-F238E27FC236}">
+                <a16:creationId xmlns:a16="http://schemas.microsoft.com/office/drawing/2014/main" id="{3514E7C5-2A16-401B-964C-EFD9C4D30CE8}"/>
+              </a:ext>
+            </a:extLst>
+          </p:cNvPr>
+          <p:cNvPicPr>
+            <a:picLocks noChangeAspect="1"/>
+          </p:cNvPicPr>
+          <p:nvPr/>
+        </p:nvPicPr>
+        <p:blipFill>
+          <a:blip r:embed="rId2"/>
+          <a:stretch>
+            <a:fillRect/>
+          </a:stretch>
+        </p:blipFill>
+        <p:spPr>
+          <a:xfrm>
+            <a:off x="2209800" y="1012809"/>
+            <a:ext cx="7772400" cy="4832381"/>
+          </a:xfrm>
+          <a:prstGeom prst="rect">
+            <a:avLst/>
+          </a:prstGeom>
+        </p:spPr>
+      </p:pic>
+      <p:sp>
+        <p:nvSpPr>
+          <p:cNvPr id="7" name="TextBox 6">
+            <a:extLst>
+              <a:ext uri="{FF2B5EF4-FFF2-40B4-BE49-F238E27FC236}">
+                <a16:creationId xmlns:a16="http://schemas.microsoft.com/office/drawing/2014/main" id="{4AA0A2CD-3D74-3B4D-9700-F6C375514B83}"/>
+              </a:ext>
+            </a:extLst>
+          </p:cNvPr>
+          <p:cNvSpPr txBox="1"/>
+          <p:nvPr/>
+        </p:nvSpPr>
+        <p:spPr>
+          <a:xfrm>
+            <a:off x="7631071" y="2316334"/>
+            <a:ext cx="1693605" cy="369332"/>
+          </a:xfrm>
+          <a:prstGeom prst="rect">
+            <a:avLst/>
+          </a:prstGeom>
+          <a:noFill/>
+        </p:spPr>
+        <p:txBody>
+          <a:bodyPr wrap="none" rtlCol="0">
+            <a:spAutoFit/>
+          </a:bodyPr>
+          <a:lstStyle/>
+          <a:p>
+            <a:r>
+              <a:rPr lang="en-US" dirty="0">
+                <a:solidFill>
+                  <a:srgbClr val="C00000"/>
+                </a:solidFill>
+              </a:rPr>
+              <a:t>Environnement</a:t>
+            </a:r>
+          </a:p>
+        </p:txBody>
+      </p:sp>
+    </p:spTree>
+    <p:extLst>
+      <p:ext uri="{BB962C8B-B14F-4D97-AF65-F5344CB8AC3E}">
+        <p14:creationId xmlns:p14="http://schemas.microsoft.com/office/powerpoint/2010/main" val="3369280188"/>
+      </p:ext>
+    </p:extLst>
+  </p:cSld>
+  <p:clrMapOvr>
+    <a:masterClrMapping/>
+  </p:clrMapOvr>
+</p:sld>
+</file>
+
 <file path=ppt/theme/theme1.xml><?xml version="1.0" encoding="utf-8"?>
 <a:theme xmlns:a="http://schemas.openxmlformats.org/drawingml/2006/main" name="Office Theme">
   <a:themeElements>

</xml_diff>

<commit_message>
Deployed 92a9e84 with MkDocs version: 1.6.0
</commit_message>
<xml_diff>
--- a/assets/images/Rstudio.pptx
+++ b/assets/images/Rstudio.pptx
@@ -8,6 +8,8 @@
     <p:sldId id="256" r:id="rId2"/>
     <p:sldId id="257" r:id="rId3"/>
     <p:sldId id="258" r:id="rId4"/>
+    <p:sldId id="259" r:id="rId5"/>
+    <p:sldId id="260" r:id="rId6"/>
   </p:sldIdLst>
   <p:sldSz cx="12192000" cy="6858000"/>
   <p:notesSz cx="6858000" cy="9144000"/>
@@ -3842,6 +3844,417 @@
 </p:sld>
 </file>
 
+<file path=ppt/slides/slide4.xml><?xml version="1.0" encoding="utf-8"?>
+<p:sld xmlns:a="http://schemas.openxmlformats.org/drawingml/2006/main" xmlns:r="http://schemas.openxmlformats.org/officeDocument/2006/relationships" xmlns:p="http://schemas.openxmlformats.org/presentationml/2006/main">
+  <p:cSld>
+    <p:spTree>
+      <p:nvGrpSpPr>
+        <p:cNvPr id="1" name=""/>
+        <p:cNvGrpSpPr/>
+        <p:nvPr/>
+      </p:nvGrpSpPr>
+      <p:grpSpPr>
+        <a:xfrm>
+          <a:off x="0" y="0"/>
+          <a:ext cx="0" cy="0"/>
+          <a:chOff x="0" y="0"/>
+          <a:chExt cx="0" cy="0"/>
+        </a:xfrm>
+      </p:grpSpPr>
+      <p:pic>
+        <p:nvPicPr>
+          <p:cNvPr id="4" name="Picture 3">
+            <a:extLst>
+              <a:ext uri="{FF2B5EF4-FFF2-40B4-BE49-F238E27FC236}">
+                <a16:creationId xmlns:a16="http://schemas.microsoft.com/office/drawing/2014/main" id="{23F07EFA-E604-C69F-A0FB-28DEA9708CB8}"/>
+              </a:ext>
+            </a:extLst>
+          </p:cNvPr>
+          <p:cNvPicPr>
+            <a:picLocks noChangeAspect="1"/>
+          </p:cNvPicPr>
+          <p:nvPr/>
+        </p:nvPicPr>
+        <p:blipFill>
+          <a:blip r:embed="rId2"/>
+          <a:stretch>
+            <a:fillRect/>
+          </a:stretch>
+        </p:blipFill>
+        <p:spPr>
+          <a:xfrm>
+            <a:off x="2209800" y="1000125"/>
+            <a:ext cx="7772400" cy="4857750"/>
+          </a:xfrm>
+          <a:prstGeom prst="rect">
+            <a:avLst/>
+          </a:prstGeom>
+        </p:spPr>
+      </p:pic>
+      <p:sp>
+        <p:nvSpPr>
+          <p:cNvPr id="5" name="TextBox 4">
+            <a:extLst>
+              <a:ext uri="{FF2B5EF4-FFF2-40B4-BE49-F238E27FC236}">
+                <a16:creationId xmlns:a16="http://schemas.microsoft.com/office/drawing/2014/main" id="{DD2FDE24-4DAE-9692-966A-36945E50FF72}"/>
+              </a:ext>
+            </a:extLst>
+          </p:cNvPr>
+          <p:cNvSpPr txBox="1"/>
+          <p:nvPr/>
+        </p:nvSpPr>
+        <p:spPr>
+          <a:xfrm>
+            <a:off x="5077773" y="5002695"/>
+            <a:ext cx="1018227" cy="369332"/>
+          </a:xfrm>
+          <a:prstGeom prst="rect">
+            <a:avLst/>
+          </a:prstGeom>
+          <a:noFill/>
+        </p:spPr>
+        <p:txBody>
+          <a:bodyPr wrap="none" rtlCol="0">
+            <a:spAutoFit/>
+          </a:bodyPr>
+          <a:lstStyle/>
+          <a:p>
+            <a:r>
+              <a:rPr lang="en-US" dirty="0">
+                <a:solidFill>
+                  <a:srgbClr val="C00000"/>
+                </a:solidFill>
+              </a:rPr>
+              <a:t>Console</a:t>
+            </a:r>
+          </a:p>
+        </p:txBody>
+      </p:sp>
+      <p:sp>
+        <p:nvSpPr>
+          <p:cNvPr id="6" name="TextBox 5">
+            <a:extLst>
+              <a:ext uri="{FF2B5EF4-FFF2-40B4-BE49-F238E27FC236}">
+                <a16:creationId xmlns:a16="http://schemas.microsoft.com/office/drawing/2014/main" id="{006E0F92-5C6D-FE08-C0A1-17AA62587CF9}"/>
+              </a:ext>
+            </a:extLst>
+          </p:cNvPr>
+          <p:cNvSpPr txBox="1"/>
+          <p:nvPr/>
+        </p:nvSpPr>
+        <p:spPr>
+          <a:xfrm>
+            <a:off x="7640492" y="5002695"/>
+            <a:ext cx="2368212" cy="369332"/>
+          </a:xfrm>
+          <a:prstGeom prst="rect">
+            <a:avLst/>
+          </a:prstGeom>
+          <a:noFill/>
+        </p:spPr>
+        <p:txBody>
+          <a:bodyPr wrap="none" rtlCol="0">
+            <a:spAutoFit/>
+          </a:bodyPr>
+          <a:lstStyle/>
+          <a:p>
+            <a:r>
+              <a:rPr lang="en-US" dirty="0" err="1">
+                <a:solidFill>
+                  <a:srgbClr val="C00000"/>
+                </a:solidFill>
+              </a:rPr>
+              <a:t>Fichiers</a:t>
+            </a:r>
+            <a:r>
+              <a:rPr lang="en-US" dirty="0">
+                <a:solidFill>
+                  <a:srgbClr val="C00000"/>
+                </a:solidFill>
+              </a:rPr>
+              <a:t> et </a:t>
+            </a:r>
+            <a:r>
+              <a:rPr lang="en-US" dirty="0" err="1">
+                <a:solidFill>
+                  <a:srgbClr val="C00000"/>
+                </a:solidFill>
+              </a:rPr>
+              <a:t>graphiques</a:t>
+            </a:r>
+            <a:endParaRPr lang="en-US" dirty="0">
+              <a:solidFill>
+                <a:srgbClr val="C00000"/>
+              </a:solidFill>
+            </a:endParaRPr>
+          </a:p>
+        </p:txBody>
+      </p:sp>
+      <p:sp>
+        <p:nvSpPr>
+          <p:cNvPr id="7" name="TextBox 6">
+            <a:extLst>
+              <a:ext uri="{FF2B5EF4-FFF2-40B4-BE49-F238E27FC236}">
+                <a16:creationId xmlns:a16="http://schemas.microsoft.com/office/drawing/2014/main" id="{3AB92859-622A-ADAD-C6DF-BBD45ED4894C}"/>
+              </a:ext>
+            </a:extLst>
+          </p:cNvPr>
+          <p:cNvSpPr txBox="1"/>
+          <p:nvPr/>
+        </p:nvSpPr>
+        <p:spPr>
+          <a:xfrm>
+            <a:off x="7694603" y="2244393"/>
+            <a:ext cx="1693605" cy="369332"/>
+          </a:xfrm>
+          <a:prstGeom prst="rect">
+            <a:avLst/>
+          </a:prstGeom>
+          <a:noFill/>
+        </p:spPr>
+        <p:txBody>
+          <a:bodyPr wrap="none" rtlCol="0">
+            <a:spAutoFit/>
+          </a:bodyPr>
+          <a:lstStyle/>
+          <a:p>
+            <a:r>
+              <a:rPr lang="en-US" dirty="0">
+                <a:solidFill>
+                  <a:srgbClr val="C00000"/>
+                </a:solidFill>
+              </a:rPr>
+              <a:t>Environnement</a:t>
+            </a:r>
+          </a:p>
+        </p:txBody>
+      </p:sp>
+      <p:sp>
+        <p:nvSpPr>
+          <p:cNvPr id="8" name="TextBox 7">
+            <a:extLst>
+              <a:ext uri="{FF2B5EF4-FFF2-40B4-BE49-F238E27FC236}">
+                <a16:creationId xmlns:a16="http://schemas.microsoft.com/office/drawing/2014/main" id="{A52995AB-C8DC-7DD1-EB09-8567281F314B}"/>
+              </a:ext>
+            </a:extLst>
+          </p:cNvPr>
+          <p:cNvSpPr txBox="1"/>
+          <p:nvPr/>
+        </p:nvSpPr>
+        <p:spPr>
+          <a:xfrm>
+            <a:off x="4497398" y="1875061"/>
+            <a:ext cx="1821011" cy="646331"/>
+          </a:xfrm>
+          <a:prstGeom prst="rect">
+            <a:avLst/>
+          </a:prstGeom>
+          <a:noFill/>
+        </p:spPr>
+        <p:txBody>
+          <a:bodyPr wrap="none" rtlCol="0">
+            <a:spAutoFit/>
+          </a:bodyPr>
+          <a:lstStyle/>
+          <a:p>
+            <a:r>
+              <a:rPr lang="en-US" dirty="0">
+                <a:solidFill>
+                  <a:srgbClr val="C00000"/>
+                </a:solidFill>
+              </a:rPr>
+              <a:t>Nouvelle </a:t>
+            </a:r>
+            <a:r>
+              <a:rPr lang="en-US" dirty="0" err="1">
+                <a:solidFill>
+                  <a:srgbClr val="C00000"/>
+                </a:solidFill>
+              </a:rPr>
+              <a:t>fenêtre</a:t>
+            </a:r>
+            <a:endParaRPr lang="en-US" dirty="0">
+              <a:solidFill>
+                <a:srgbClr val="C00000"/>
+              </a:solidFill>
+            </a:endParaRPr>
+          </a:p>
+          <a:p>
+            <a:r>
+              <a:rPr lang="en-US" dirty="0">
+                <a:solidFill>
+                  <a:srgbClr val="C00000"/>
+                </a:solidFill>
+              </a:rPr>
+              <a:t>de script</a:t>
+            </a:r>
+          </a:p>
+        </p:txBody>
+      </p:sp>
+    </p:spTree>
+    <p:extLst>
+      <p:ext uri="{BB962C8B-B14F-4D97-AF65-F5344CB8AC3E}">
+        <p14:creationId xmlns:p14="http://schemas.microsoft.com/office/powerpoint/2010/main" val="3033887602"/>
+      </p:ext>
+    </p:extLst>
+  </p:cSld>
+  <p:clrMapOvr>
+    <a:masterClrMapping/>
+  </p:clrMapOvr>
+</p:sld>
+</file>
+
+<file path=ppt/slides/slide5.xml><?xml version="1.0" encoding="utf-8"?>
+<p:sld xmlns:a="http://schemas.openxmlformats.org/drawingml/2006/main" xmlns:r="http://schemas.openxmlformats.org/officeDocument/2006/relationships" xmlns:p="http://schemas.openxmlformats.org/presentationml/2006/main">
+  <p:cSld>
+    <p:spTree>
+      <p:nvGrpSpPr>
+        <p:cNvPr id="1" name=""/>
+        <p:cNvGrpSpPr/>
+        <p:nvPr/>
+      </p:nvGrpSpPr>
+      <p:grpSpPr>
+        <a:xfrm>
+          <a:off x="0" y="0"/>
+          <a:ext cx="0" cy="0"/>
+          <a:chOff x="0" y="0"/>
+          <a:chExt cx="0" cy="0"/>
+        </a:xfrm>
+      </p:grpSpPr>
+      <p:pic>
+        <p:nvPicPr>
+          <p:cNvPr id="4" name="Picture 3">
+            <a:extLst>
+              <a:ext uri="{FF2B5EF4-FFF2-40B4-BE49-F238E27FC236}">
+                <a16:creationId xmlns:a16="http://schemas.microsoft.com/office/drawing/2014/main" id="{FF0BB029-2CD7-5B44-2144-8E6A101CAF7C}"/>
+              </a:ext>
+            </a:extLst>
+          </p:cNvPr>
+          <p:cNvPicPr>
+            <a:picLocks noChangeAspect="1"/>
+          </p:cNvPicPr>
+          <p:nvPr/>
+        </p:nvPicPr>
+        <p:blipFill>
+          <a:blip r:embed="rId2"/>
+          <a:stretch>
+            <a:fillRect/>
+          </a:stretch>
+        </p:blipFill>
+        <p:spPr>
+          <a:xfrm>
+            <a:off x="2209800" y="1006648"/>
+            <a:ext cx="7772400" cy="4844704"/>
+          </a:xfrm>
+          <a:prstGeom prst="rect">
+            <a:avLst/>
+          </a:prstGeom>
+        </p:spPr>
+      </p:pic>
+      <p:sp>
+        <p:nvSpPr>
+          <p:cNvPr id="6" name="TextBox 5">
+            <a:extLst>
+              <a:ext uri="{FF2B5EF4-FFF2-40B4-BE49-F238E27FC236}">
+                <a16:creationId xmlns:a16="http://schemas.microsoft.com/office/drawing/2014/main" id="{1B1E03AB-5D61-34D5-E8DF-BABB50C922AD}"/>
+              </a:ext>
+            </a:extLst>
+          </p:cNvPr>
+          <p:cNvSpPr txBox="1"/>
+          <p:nvPr/>
+        </p:nvSpPr>
+        <p:spPr>
+          <a:xfrm>
+            <a:off x="4852486" y="2007704"/>
+            <a:ext cx="1526315" cy="369332"/>
+          </a:xfrm>
+          <a:prstGeom prst="rect">
+            <a:avLst/>
+          </a:prstGeom>
+          <a:noFill/>
+        </p:spPr>
+        <p:txBody>
+          <a:bodyPr wrap="none" rtlCol="0">
+            <a:spAutoFit/>
+          </a:bodyPr>
+          <a:lstStyle/>
+          <a:p>
+            <a:r>
+              <a:rPr lang="en-US" dirty="0">
+                <a:solidFill>
+                  <a:srgbClr val="C00000"/>
+                </a:solidFill>
+              </a:rPr>
+              <a:t>Bouton “Run”</a:t>
+            </a:r>
+          </a:p>
+        </p:txBody>
+      </p:sp>
+      <p:sp>
+        <p:nvSpPr>
+          <p:cNvPr id="7" name="Right Arrow 6">
+            <a:extLst>
+              <a:ext uri="{FF2B5EF4-FFF2-40B4-BE49-F238E27FC236}">
+                <a16:creationId xmlns:a16="http://schemas.microsoft.com/office/drawing/2014/main" id="{68601850-099D-C284-BA73-22E786DB90F2}"/>
+              </a:ext>
+            </a:extLst>
+          </p:cNvPr>
+          <p:cNvSpPr/>
+          <p:nvPr/>
+        </p:nvSpPr>
+        <p:spPr>
+          <a:xfrm rot="16200000">
+            <a:off x="5380417" y="1776266"/>
+            <a:ext cx="344556" cy="205408"/>
+          </a:xfrm>
+          <a:prstGeom prst="rightArrow">
+            <a:avLst/>
+          </a:prstGeom>
+          <a:solidFill>
+            <a:srgbClr val="C00000"/>
+          </a:solidFill>
+          <a:ln>
+            <a:noFill/>
+          </a:ln>
+        </p:spPr>
+        <p:style>
+          <a:lnRef idx="2">
+            <a:schemeClr val="accent1">
+              <a:shade val="15000"/>
+            </a:schemeClr>
+          </a:lnRef>
+          <a:fillRef idx="1">
+            <a:schemeClr val="accent1"/>
+          </a:fillRef>
+          <a:effectRef idx="0">
+            <a:schemeClr val="accent1"/>
+          </a:effectRef>
+          <a:fontRef idx="minor">
+            <a:schemeClr val="lt1"/>
+          </a:fontRef>
+        </p:style>
+        <p:txBody>
+          <a:bodyPr rtlCol="0" anchor="ctr"/>
+          <a:lstStyle/>
+          <a:p>
+            <a:pPr algn="ctr"/>
+            <a:endParaRPr lang="en-US"/>
+          </a:p>
+        </p:txBody>
+      </p:sp>
+    </p:spTree>
+    <p:extLst>
+      <p:ext uri="{BB962C8B-B14F-4D97-AF65-F5344CB8AC3E}">
+        <p14:creationId xmlns:p14="http://schemas.microsoft.com/office/powerpoint/2010/main" val="3723008991"/>
+      </p:ext>
+    </p:extLst>
+  </p:cSld>
+  <p:clrMapOvr>
+    <a:masterClrMapping/>
+  </p:clrMapOvr>
+</p:sld>
+</file>
+
 <file path=ppt/theme/theme1.xml><?xml version="1.0" encoding="utf-8"?>
 <a:theme xmlns:a="http://schemas.openxmlformats.org/drawingml/2006/main" name="Office Theme">
   <a:themeElements>

</xml_diff>